<commit_message>
Random things + Prez
</commit_message>
<xml_diff>
--- a/Documentation/Presentation project.pptx
+++ b/Documentation/Presentation project.pptx
@@ -10,12 +10,15 @@
     <p:sldId id="265" r:id="rId4"/>
     <p:sldId id="266" r:id="rId5"/>
     <p:sldId id="258" r:id="rId6"/>
-    <p:sldId id="267" r:id="rId7"/>
-    <p:sldId id="262" r:id="rId8"/>
-    <p:sldId id="259" r:id="rId9"/>
-    <p:sldId id="260" r:id="rId10"/>
-    <p:sldId id="263" r:id="rId11"/>
-    <p:sldId id="264" r:id="rId12"/>
+    <p:sldId id="268" r:id="rId7"/>
+    <p:sldId id="267" r:id="rId8"/>
+    <p:sldId id="262" r:id="rId9"/>
+    <p:sldId id="259" r:id="rId10"/>
+    <p:sldId id="260" r:id="rId11"/>
+    <p:sldId id="269" r:id="rId12"/>
+    <p:sldId id="270" r:id="rId13"/>
+    <p:sldId id="263" r:id="rId14"/>
+    <p:sldId id="264" r:id="rId15"/>
   </p:sldIdLst>
   <p:sldSz cx="9144000" cy="6858000" type="screen4x3"/>
   <p:notesSz cx="6858000" cy="9144000"/>
@@ -970,7 +973,11 @@
         <a:p>
           <a:r>
             <a:rPr lang="en-US" noProof="0" dirty="0" smtClean="0"/>
-            <a:t>Back end developer</a:t>
+            <a:t>Back-End </a:t>
+          </a:r>
+          <a:r>
+            <a:rPr lang="en-US" noProof="0" dirty="0" smtClean="0"/>
+            <a:t>developer</a:t>
           </a:r>
           <a:endParaRPr lang="en-US" noProof="0" dirty="0"/>
         </a:p>
@@ -1011,7 +1018,11 @@
         <a:p>
           <a:r>
             <a:rPr lang="en-US" noProof="0" dirty="0" smtClean="0"/>
-            <a:t>SQL developer</a:t>
+            <a:t>SQL/Database </a:t>
+          </a:r>
+          <a:r>
+            <a:rPr lang="en-US" noProof="0" dirty="0" smtClean="0"/>
+            <a:t>developer</a:t>
           </a:r>
           <a:endParaRPr lang="en-US" noProof="0" dirty="0"/>
         </a:p>
@@ -1097,7 +1108,11 @@
         <a:p>
           <a:r>
             <a:rPr lang="en-US" noProof="0" dirty="0" smtClean="0"/>
-            <a:t>Front end developer</a:t>
+            <a:t>Front-End </a:t>
+          </a:r>
+          <a:r>
+            <a:rPr lang="en-US" noProof="0" dirty="0" smtClean="0"/>
+            <a:t>developer</a:t>
           </a:r>
           <a:endParaRPr lang="en-US" noProof="0" dirty="0"/>
         </a:p>
@@ -2133,7 +2148,11 @@
           </a:pPr>
           <a:r>
             <a:rPr lang="en-US" sz="1200" kern="1200" noProof="0" dirty="0" smtClean="0"/>
-            <a:t>Back end developer</a:t>
+            <a:t>Back-End </a:t>
+          </a:r>
+          <a:r>
+            <a:rPr lang="en-US" sz="1200" kern="1200" noProof="0" dirty="0" smtClean="0"/>
+            <a:t>developer</a:t>
           </a:r>
           <a:endParaRPr lang="en-US" sz="1200" kern="1200" noProof="0" dirty="0"/>
         </a:p>
@@ -2469,7 +2488,11 @@
           </a:pPr>
           <a:r>
             <a:rPr lang="en-US" sz="1100" kern="1200" noProof="0" dirty="0" smtClean="0"/>
-            <a:t>Front end developer</a:t>
+            <a:t>Front-End </a:t>
+          </a:r>
+          <a:r>
+            <a:rPr lang="en-US" sz="1100" kern="1200" noProof="0" dirty="0" smtClean="0"/>
+            <a:t>developer</a:t>
           </a:r>
           <a:endParaRPr lang="en-US" sz="1100" kern="1200" noProof="0" dirty="0"/>
         </a:p>
@@ -2617,12 +2640,12 @@
         <a:fontRef idx="minor"/>
       </dsp:style>
       <dsp:txBody>
-        <a:bodyPr spcFirstLastPara="0" vert="horz" wrap="square" lIns="38100" tIns="9525" rIns="38100" bIns="9525" numCol="1" spcCol="1270" anchor="ctr" anchorCtr="0">
+        <a:bodyPr spcFirstLastPara="0" vert="horz" wrap="square" lIns="22860" tIns="5715" rIns="22860" bIns="5715" numCol="1" spcCol="1270" anchor="ctr" anchorCtr="0">
           <a:noAutofit/>
         </a:bodyPr>
         <a:lstStyle/>
         <a:p>
-          <a:pPr lvl="0" algn="r" defTabSz="666750">
+          <a:pPr lvl="0" algn="r" defTabSz="400050">
             <a:lnSpc>
               <a:spcPct val="90000"/>
             </a:lnSpc>
@@ -2634,10 +2657,14 @@
             </a:spcAft>
           </a:pPr>
           <a:r>
-            <a:rPr lang="en-US" sz="1500" kern="1200" noProof="0" dirty="0" smtClean="0"/>
-            <a:t>SQL developer</a:t>
+            <a:rPr lang="en-US" sz="900" kern="1200" noProof="0" dirty="0" smtClean="0"/>
+            <a:t>SQL/Database </a:t>
           </a:r>
-          <a:endParaRPr lang="en-US" sz="1500" kern="1200" noProof="0" dirty="0"/>
+          <a:r>
+            <a:rPr lang="en-US" sz="900" kern="1200" noProof="0" dirty="0" smtClean="0"/>
+            <a:t>developer</a:t>
+          </a:r>
+          <a:endParaRPr lang="en-US" sz="900" kern="1200" noProof="0" dirty="0"/>
         </a:p>
       </dsp:txBody>
       <dsp:txXfrm>
@@ -5481,7 +5508,7 @@
           </a:ln>
           <a:extLst>
             <a:ext uri="{91240B29-F687-4f45-9708-019B960494DF}">
-              <a14:hiddenLine xmlns:a14="http://schemas.microsoft.com/office/drawing/2010/main" xmlns="" w="9525">
+              <a14:hiddenLine xmlns="" xmlns:a14="http://schemas.microsoft.com/office/drawing/2010/main" w="9525">
                 <a:solidFill>
                   <a:srgbClr val="000000"/>
                 </a:solidFill>
@@ -5536,7 +5563,7 @@
           </a:ln>
           <a:extLst>
             <a:ext uri="{91240B29-F687-4f45-9708-019B960494DF}">
-              <a14:hiddenLine xmlns:a14="http://schemas.microsoft.com/office/drawing/2010/main" xmlns="" w="9525">
+              <a14:hiddenLine xmlns="" xmlns:a14="http://schemas.microsoft.com/office/drawing/2010/main" w="9525">
                 <a:solidFill>
                   <a:srgbClr val="000000"/>
                 </a:solidFill>
@@ -11053,16 +11080,16 @@
           <a:lstStyle/>
           <a:p>
             <a:r>
+              <a:rPr lang="fr-FR" u="sng" dirty="0" err="1" smtClean="0"/>
+              <a:t>Webdev</a:t>
+            </a:r>
+            <a:r>
               <a:rPr lang="fr-FR" u="sng" dirty="0" smtClean="0"/>
-              <a:t>Web-</a:t>
-            </a:r>
-            <a:r>
-              <a:rPr lang="fr-FR" u="sng" dirty="0" err="1" smtClean="0"/>
-              <a:t>dev</a:t>
+              <a:t> </a:t>
             </a:r>
             <a:r>
               <a:rPr lang="fr-FR" u="sng" dirty="0" smtClean="0"/>
-              <a:t> project</a:t>
+              <a:t>project</a:t>
             </a:r>
             <a:br>
               <a:rPr lang="fr-FR" u="sng" dirty="0" smtClean="0"/>
@@ -11187,6 +11214,103 @@
       </p:grpSpPr>
       <p:sp>
         <p:nvSpPr>
+          <p:cNvPr id="6" name="Titre 5"/>
+          <p:cNvSpPr>
+            <a:spLocks noGrp="1"/>
+          </p:cNvSpPr>
+          <p:nvPr>
+            <p:ph type="title"/>
+          </p:nvPr>
+        </p:nvSpPr>
+        <p:spPr/>
+        <p:txBody>
+          <a:bodyPr/>
+          <a:lstStyle/>
+          <a:p>
+            <a:r>
+              <a:rPr lang="fr-FR" dirty="0" smtClean="0"/>
+              <a:t>Login/</a:t>
+            </a:r>
+            <a:r>
+              <a:rPr lang="fr-FR" dirty="0" err="1" smtClean="0"/>
+              <a:t>register</a:t>
+            </a:r>
+            <a:r>
+              <a:rPr lang="fr-FR" dirty="0" smtClean="0"/>
+              <a:t> </a:t>
+            </a:r>
+            <a:r>
+              <a:rPr lang="fr-FR" dirty="0" err="1" smtClean="0"/>
+              <a:t>view</a:t>
+            </a:r>
+            <a:r>
+              <a:rPr lang="fr-FR" dirty="0" smtClean="0"/>
+              <a:t>:</a:t>
+            </a:r>
+            <a:endParaRPr lang="fr-FR" dirty="0"/>
+          </a:p>
+        </p:txBody>
+      </p:sp>
+      <p:pic>
+        <p:nvPicPr>
+          <p:cNvPr id="8" name="Espace réservé du contenu 7"/>
+          <p:cNvPicPr>
+            <a:picLocks noGrp="1" noChangeAspect="1"/>
+          </p:cNvPicPr>
+          <p:nvPr>
+            <p:ph idx="1"/>
+          </p:nvPr>
+        </p:nvPicPr>
+        <p:blipFill rotWithShape="1">
+          <a:blip r:embed="rId2" cstate="print">
+            <a:extLst>
+              <a:ext uri="{28A0092B-C50C-407E-A947-70E740481C1C}">
+                <a14:useLocalDpi xmlns:a14="http://schemas.microsoft.com/office/drawing/2010/main" val="0"/>
+              </a:ext>
+            </a:extLst>
+          </a:blip>
+          <a:srcRect r="5681" b="-2289"/>
+          <a:stretch/>
+        </p:blipFill>
+        <p:spPr>
+          <a:xfrm>
+            <a:off x="899481" y="2438401"/>
+            <a:ext cx="7869970" cy="3222847"/>
+          </a:xfrm>
+        </p:spPr>
+      </p:pic>
+    </p:spTree>
+    <p:extLst>
+      <p:ext uri="{BB962C8B-B14F-4D97-AF65-F5344CB8AC3E}">
+        <p14:creationId xmlns:p14="http://schemas.microsoft.com/office/powerpoint/2010/main" val="2542732291"/>
+      </p:ext>
+    </p:extLst>
+  </p:cSld>
+  <p:clrMapOvr>
+    <a:masterClrMapping/>
+  </p:clrMapOvr>
+</p:sld>
+</file>
+
+<file path=ppt/slides/slide11.xml><?xml version="1.0" encoding="utf-8"?>
+<p:sld xmlns:a="http://schemas.openxmlformats.org/drawingml/2006/main" xmlns:r="http://schemas.openxmlformats.org/officeDocument/2006/relationships" xmlns:p="http://schemas.openxmlformats.org/presentationml/2006/main">
+  <p:cSld>
+    <p:spTree>
+      <p:nvGrpSpPr>
+        <p:cNvPr id="1" name=""/>
+        <p:cNvGrpSpPr/>
+        <p:nvPr/>
+      </p:nvGrpSpPr>
+      <p:grpSpPr>
+        <a:xfrm>
+          <a:off x="0" y="0"/>
+          <a:ext cx="0" cy="0"/>
+          <a:chOff x="0" y="0"/>
+          <a:chExt cx="0" cy="0"/>
+        </a:xfrm>
+      </p:grpSpPr>
+      <p:sp>
+        <p:nvSpPr>
           <p:cNvPr id="2" name="Titre 1"/>
           <p:cNvSpPr>
             <a:spLocks noGrp="1"/>
@@ -11201,16 +11325,183 @@
           <a:lstStyle/>
           <a:p>
             <a:r>
+              <a:rPr lang="fr-FR" dirty="0" err="1" smtClean="0"/>
+              <a:t>Products</a:t>
+            </a:r>
+            <a:r>
               <a:rPr lang="fr-FR" dirty="0" smtClean="0"/>
-              <a:t>Conclusion :</a:t>
+              <a:t> display:</a:t>
             </a:r>
             <a:endParaRPr lang="fr-FR" dirty="0"/>
+          </a:p>
+        </p:txBody>
+      </p:sp>
+      <p:pic>
+        <p:nvPicPr>
+          <p:cNvPr id="4" name="Espace réservé du contenu 3"/>
+          <p:cNvPicPr>
+            <a:picLocks noGrp="1" noChangeAspect="1"/>
+          </p:cNvPicPr>
+          <p:nvPr>
+            <p:ph idx="1"/>
+          </p:nvPr>
+        </p:nvPicPr>
+        <p:blipFill rotWithShape="1">
+          <a:blip r:embed="rId2" cstate="print">
+            <a:extLst>
+              <a:ext uri="{28A0092B-C50C-407E-A947-70E740481C1C}">
+                <a14:useLocalDpi xmlns:a14="http://schemas.microsoft.com/office/drawing/2010/main" val="0"/>
+              </a:ext>
+            </a:extLst>
+          </a:blip>
+          <a:srcRect r="6991" b="-102"/>
+          <a:stretch/>
+        </p:blipFill>
+        <p:spPr>
+          <a:xfrm>
+            <a:off x="913835" y="2438401"/>
+            <a:ext cx="7841262" cy="3366863"/>
+          </a:xfrm>
+        </p:spPr>
+      </p:pic>
+    </p:spTree>
+    <p:extLst>
+      <p:ext uri="{BB962C8B-B14F-4D97-AF65-F5344CB8AC3E}">
+        <p14:creationId xmlns:p14="http://schemas.microsoft.com/office/powerpoint/2010/main" val="1691659181"/>
+      </p:ext>
+    </p:extLst>
+  </p:cSld>
+  <p:clrMapOvr>
+    <a:masterClrMapping/>
+  </p:clrMapOvr>
+</p:sld>
+</file>
+
+<file path=ppt/slides/slide12.xml><?xml version="1.0" encoding="utf-8"?>
+<p:sld xmlns:a="http://schemas.openxmlformats.org/drawingml/2006/main" xmlns:r="http://schemas.openxmlformats.org/officeDocument/2006/relationships" xmlns:p="http://schemas.openxmlformats.org/presentationml/2006/main">
+  <p:cSld>
+    <p:spTree>
+      <p:nvGrpSpPr>
+        <p:cNvPr id="1" name=""/>
+        <p:cNvGrpSpPr/>
+        <p:nvPr/>
+      </p:nvGrpSpPr>
+      <p:grpSpPr>
+        <a:xfrm>
+          <a:off x="0" y="0"/>
+          <a:ext cx="0" cy="0"/>
+          <a:chOff x="0" y="0"/>
+          <a:chExt cx="0" cy="0"/>
+        </a:xfrm>
+      </p:grpSpPr>
+      <p:sp>
+        <p:nvSpPr>
+          <p:cNvPr id="2" name="Titre 1"/>
+          <p:cNvSpPr>
+            <a:spLocks noGrp="1"/>
+          </p:cNvSpPr>
+          <p:nvPr>
+            <p:ph type="title"/>
+          </p:nvPr>
+        </p:nvSpPr>
+        <p:spPr/>
+        <p:txBody>
+          <a:bodyPr/>
+          <a:lstStyle/>
+          <a:p>
+            <a:r>
+              <a:rPr lang="fr-FR" dirty="0" smtClean="0"/>
+              <a:t>MCD:</a:t>
+            </a:r>
+            <a:endParaRPr lang="fr-FR" dirty="0"/>
+          </a:p>
+        </p:txBody>
+      </p:sp>
+      <p:pic>
+        <p:nvPicPr>
+          <p:cNvPr id="4" name="Espace réservé du contenu 3"/>
+          <p:cNvPicPr>
+            <a:picLocks noGrp="1" noChangeAspect="1"/>
+          </p:cNvPicPr>
+          <p:nvPr>
+            <p:ph idx="1"/>
+          </p:nvPr>
+        </p:nvPicPr>
+        <p:blipFill>
+          <a:blip r:embed="rId2">
+            <a:extLst>
+              <a:ext uri="{28A0092B-C50C-407E-A947-70E740481C1C}">
+                <a14:useLocalDpi xmlns:a14="http://schemas.microsoft.com/office/drawing/2010/main" val="0"/>
+              </a:ext>
+            </a:extLst>
+          </a:blip>
+          <a:stretch>
+            <a:fillRect/>
+          </a:stretch>
+        </p:blipFill>
+        <p:spPr>
+          <a:xfrm>
+            <a:off x="395536" y="2060848"/>
+            <a:ext cx="8623413" cy="3649514"/>
+          </a:xfrm>
+        </p:spPr>
+      </p:pic>
+    </p:spTree>
+    <p:extLst>
+      <p:ext uri="{BB962C8B-B14F-4D97-AF65-F5344CB8AC3E}">
+        <p14:creationId xmlns:p14="http://schemas.microsoft.com/office/powerpoint/2010/main" val="1389133009"/>
+      </p:ext>
+    </p:extLst>
+  </p:cSld>
+  <p:clrMapOvr>
+    <a:masterClrMapping/>
+  </p:clrMapOvr>
+</p:sld>
+</file>
+
+<file path=ppt/slides/slide13.xml><?xml version="1.0" encoding="utf-8"?>
+<p:sld xmlns:a="http://schemas.openxmlformats.org/drawingml/2006/main" xmlns:r="http://schemas.openxmlformats.org/officeDocument/2006/relationships" xmlns:p="http://schemas.openxmlformats.org/presentationml/2006/main">
+  <p:cSld>
+    <p:spTree>
+      <p:nvGrpSpPr>
+        <p:cNvPr id="1" name=""/>
+        <p:cNvGrpSpPr/>
+        <p:nvPr/>
+      </p:nvGrpSpPr>
+      <p:grpSpPr>
+        <a:xfrm>
+          <a:off x="0" y="0"/>
+          <a:ext cx="0" cy="0"/>
+          <a:chOff x="0" y="0"/>
+          <a:chExt cx="0" cy="0"/>
+        </a:xfrm>
+      </p:grpSpPr>
+      <p:sp>
+        <p:nvSpPr>
+          <p:cNvPr id="2" name="Titre 1"/>
+          <p:cNvSpPr>
+            <a:spLocks noGrp="1"/>
+          </p:cNvSpPr>
+          <p:nvPr>
+            <p:ph type="title"/>
+          </p:nvPr>
+        </p:nvSpPr>
+        <p:spPr/>
+        <p:txBody>
+          <a:bodyPr/>
+          <a:lstStyle/>
+          <a:p>
+            <a:r>
+              <a:rPr lang="en-US" dirty="0" smtClean="0"/>
+              <a:t>Conclusion:</a:t>
+            </a:r>
+            <a:endParaRPr lang="en-US" dirty="0"/>
           </a:p>
         </p:txBody>
       </p:sp>
       <p:sp>
         <p:nvSpPr>
-          <p:cNvPr id="3" name="Espace réservé du contenu 2"/>
+          <p:cNvPr id="12" name="Espace réservé du contenu 11"/>
           <p:cNvSpPr>
             <a:spLocks noGrp="1"/>
           </p:cNvSpPr>
@@ -11218,12 +11509,59 @@
             <p:ph idx="1"/>
           </p:nvPr>
         </p:nvSpPr>
-        <p:spPr/>
+        <p:spPr>
+          <a:xfrm>
+            <a:off x="982132" y="2276872"/>
+            <a:ext cx="7704667" cy="3332816"/>
+          </a:xfrm>
+        </p:spPr>
         <p:txBody>
-          <a:bodyPr/>
+          <a:bodyPr anchor="t"/>
           <a:lstStyle/>
           <a:p>
-            <a:endParaRPr lang="fr-FR"/>
+            <a:pPr marL="0" indent="0" algn="ctr">
+              <a:buNone/>
+            </a:pPr>
+            <a:r>
+              <a:rPr lang="en-US" sz="3200" dirty="0" smtClean="0">
+                <a:solidFill>
+                  <a:srgbClr val="0070C0"/>
+                </a:solidFill>
+              </a:rPr>
+              <a:t>Deviations:</a:t>
+            </a:r>
+          </a:p>
+          <a:p>
+            <a:r>
+              <a:rPr lang="en-US" dirty="0" smtClean="0"/>
+              <a:t>Displaying </a:t>
+            </a:r>
+            <a:r>
+              <a:rPr lang="en-US" dirty="0"/>
+              <a:t>products</a:t>
+            </a:r>
+          </a:p>
+          <a:p>
+            <a:r>
+              <a:rPr lang="en-US" dirty="0"/>
+              <a:t>Payment </a:t>
+            </a:r>
+            <a:r>
+              <a:rPr lang="en-US" dirty="0" smtClean="0"/>
+              <a:t>process</a:t>
+            </a:r>
+          </a:p>
+          <a:p>
+            <a:r>
+              <a:rPr lang="en-US" dirty="0" smtClean="0"/>
+              <a:t>Missing dynamic HTML</a:t>
+            </a:r>
+          </a:p>
+          <a:p>
+            <a:endParaRPr lang="en-US" dirty="0"/>
+          </a:p>
+          <a:p>
+            <a:endParaRPr lang="fr-FR" dirty="0"/>
           </a:p>
         </p:txBody>
       </p:sp>
@@ -11240,7 +11578,7 @@
 </p:sld>
 </file>
 
-<file path=ppt/slides/slide11.xml><?xml version="1.0" encoding="utf-8"?>
+<file path=ppt/slides/slide14.xml><?xml version="1.0" encoding="utf-8"?>
 <p:sld xmlns:a="http://schemas.openxmlformats.org/drawingml/2006/main" xmlns:r="http://schemas.openxmlformats.org/officeDocument/2006/relationships" xmlns:p="http://schemas.openxmlformats.org/presentationml/2006/main">
   <p:cSld>
     <p:spTree>
@@ -11458,7 +11796,7 @@
           <a:p>
             <a:r>
               <a:rPr lang="fr-FR" dirty="0" smtClean="0"/>
-              <a:t>Introduction :</a:t>
+              <a:t>Introduction:</a:t>
             </a:r>
             <a:endParaRPr lang="fr-FR" dirty="0"/>
           </a:p>
@@ -11474,7 +11812,12 @@
             <p:ph idx="1"/>
           </p:nvPr>
         </p:nvSpPr>
-        <p:spPr/>
+        <p:spPr>
+          <a:xfrm>
+            <a:off x="899592" y="1988840"/>
+            <a:ext cx="7704667" cy="3332816"/>
+          </a:xfrm>
+        </p:spPr>
         <p:txBody>
           <a:bodyPr anchor="ctr"/>
           <a:lstStyle/>
@@ -11557,7 +11900,7 @@
           <a:p>
             <a:r>
               <a:rPr lang="en-US" dirty="0" smtClean="0"/>
-              <a:t>Specs :</a:t>
+              <a:t>Specs:</a:t>
             </a:r>
             <a:endParaRPr lang="en-US" dirty="0"/>
           </a:p>
@@ -11592,11 +11935,7 @@
             </a:r>
             <a:r>
               <a:rPr lang="en-US" dirty="0" smtClean="0"/>
-              <a:t>asket </a:t>
-            </a:r>
-            <a:r>
-              <a:rPr lang="en-US" dirty="0" smtClean="0"/>
-              <a:t>for storing chosen products</a:t>
+              <a:t>asket for storing chosen products</a:t>
             </a:r>
           </a:p>
           <a:p>
@@ -11604,7 +11943,6 @@
               <a:rPr lang="en-US" dirty="0" smtClean="0"/>
               <a:t>Searching function</a:t>
             </a:r>
-            <a:endParaRPr lang="en-US" dirty="0" smtClean="0"/>
           </a:p>
           <a:p>
             <a:r>
@@ -11617,7 +11955,6 @@
               <a:rPr lang="en-US" dirty="0" smtClean="0"/>
               <a:t>Using PDO and MVC model</a:t>
             </a:r>
-            <a:endParaRPr lang="en-US" dirty="0" smtClean="0"/>
           </a:p>
           <a:p>
             <a:r>
@@ -11630,7 +11967,6 @@
               <a:rPr lang="en-US" dirty="0" smtClean="0"/>
               <a:t>Responsive designed website</a:t>
             </a:r>
-            <a:endParaRPr lang="en-US" dirty="0" smtClean="0"/>
           </a:p>
           <a:p>
             <a:r>
@@ -11691,7 +12027,7 @@
           <a:p>
             <a:r>
               <a:rPr lang="en-US" dirty="0" smtClean="0"/>
-              <a:t>Organization :</a:t>
+              <a:t>Organization:</a:t>
             </a:r>
             <a:endParaRPr lang="en-US" dirty="0"/>
           </a:p>
@@ -11707,13 +12043,13 @@
             <p:ph idx="1"/>
             <p:extLst>
               <p:ext uri="{D42A27DB-BD31-4B8C-83A1-F6EECF244321}">
-                <p14:modId xmlns:p14="http://schemas.microsoft.com/office/powerpoint/2010/main" val="1912657430"/>
+                <p14:modId xmlns:p14="http://schemas.microsoft.com/office/powerpoint/2010/main" val="2855058849"/>
               </p:ext>
             </p:extLst>
           </p:nvPr>
         </p:nvGraphicFramePr>
         <p:xfrm>
-          <a:off x="982663" y="2667000"/>
+          <a:off x="979136" y="2276872"/>
           <a:ext cx="7704137" cy="3332163"/>
         </p:xfrm>
         <a:graphic>
@@ -11743,6 +12079,1311 @@
 </file>
 
 <file path=ppt/slides/slide6.xml><?xml version="1.0" encoding="utf-8"?>
+<p:sld xmlns:a="http://schemas.openxmlformats.org/drawingml/2006/main" xmlns:r="http://schemas.openxmlformats.org/officeDocument/2006/relationships" xmlns:p="http://schemas.openxmlformats.org/presentationml/2006/main">
+  <p:cSld>
+    <p:spTree>
+      <p:nvGrpSpPr>
+        <p:cNvPr id="1" name=""/>
+        <p:cNvGrpSpPr/>
+        <p:nvPr/>
+      </p:nvGrpSpPr>
+      <p:grpSpPr>
+        <a:xfrm>
+          <a:off x="0" y="0"/>
+          <a:ext cx="0" cy="0"/>
+          <a:chOff x="0" y="0"/>
+          <a:chExt cx="0" cy="0"/>
+        </a:xfrm>
+      </p:grpSpPr>
+      <p:sp>
+        <p:nvSpPr>
+          <p:cNvPr id="2" name="Titre 1"/>
+          <p:cNvSpPr>
+            <a:spLocks noGrp="1"/>
+          </p:cNvSpPr>
+          <p:nvPr>
+            <p:ph type="title"/>
+          </p:nvPr>
+        </p:nvSpPr>
+        <p:spPr/>
+        <p:txBody>
+          <a:bodyPr/>
+          <a:lstStyle/>
+          <a:p>
+            <a:r>
+              <a:rPr lang="en-US" dirty="0" smtClean="0"/>
+              <a:t>Organization:</a:t>
+            </a:r>
+            <a:endParaRPr lang="en-US" dirty="0"/>
+          </a:p>
+        </p:txBody>
+      </p:sp>
+      <p:sp>
+        <p:nvSpPr>
+          <p:cNvPr id="4" name="Espace réservé du texte 3"/>
+          <p:cNvSpPr>
+            <a:spLocks noGrp="1"/>
+          </p:cNvSpPr>
+          <p:nvPr>
+            <p:ph type="body" idx="1"/>
+          </p:nvPr>
+        </p:nvSpPr>
+        <p:spPr>
+          <a:xfrm>
+            <a:off x="868548" y="2051785"/>
+            <a:ext cx="1783240" cy="576262"/>
+          </a:xfrm>
+        </p:spPr>
+        <p:txBody>
+          <a:bodyPr/>
+          <a:lstStyle/>
+          <a:p>
+            <a:pPr algn="ctr"/>
+            <a:r>
+              <a:rPr lang="en-US" sz="2000" dirty="0" smtClean="0"/>
+              <a:t>Front-End </a:t>
+            </a:r>
+            <a:endParaRPr lang="en-US" sz="2000" dirty="0"/>
+          </a:p>
+        </p:txBody>
+      </p:sp>
+      <p:sp>
+        <p:nvSpPr>
+          <p:cNvPr id="5" name="Espace réservé du contenu 4"/>
+          <p:cNvSpPr>
+            <a:spLocks noGrp="1"/>
+          </p:cNvSpPr>
+          <p:nvPr>
+            <p:ph sz="half" idx="2"/>
+          </p:nvPr>
+        </p:nvSpPr>
+        <p:spPr>
+          <a:xfrm>
+            <a:off x="714557" y="2792618"/>
+            <a:ext cx="1918990" cy="2665259"/>
+          </a:xfrm>
+          <a:ln>
+            <a:solidFill>
+              <a:schemeClr val="tx1"/>
+            </a:solidFill>
+          </a:ln>
+        </p:spPr>
+        <p:txBody>
+          <a:bodyPr>
+            <a:normAutofit/>
+          </a:bodyPr>
+          <a:lstStyle/>
+          <a:p>
+            <a:r>
+              <a:rPr lang="en-US" sz="2000" dirty="0" smtClean="0"/>
+              <a:t>Functions:</a:t>
+            </a:r>
+          </a:p>
+          <a:p>
+            <a:r>
+              <a:rPr lang="en-US" sz="1400" dirty="0" smtClean="0"/>
+              <a:t>Register</a:t>
+            </a:r>
+          </a:p>
+          <a:p>
+            <a:r>
+              <a:rPr lang="en-US" sz="1400" dirty="0" smtClean="0"/>
+              <a:t>Connection</a:t>
+            </a:r>
+          </a:p>
+          <a:p>
+            <a:r>
+              <a:rPr lang="en-US" sz="1400" dirty="0" smtClean="0"/>
+              <a:t>Basket</a:t>
+            </a:r>
+          </a:p>
+          <a:p>
+            <a:r>
+              <a:rPr lang="en-US" sz="1400" dirty="0" smtClean="0"/>
+              <a:t>Payment</a:t>
+            </a:r>
+          </a:p>
+          <a:p>
+            <a:endParaRPr lang="en-US" dirty="0" smtClean="0"/>
+          </a:p>
+          <a:p>
+            <a:endParaRPr lang="en-US" dirty="0"/>
+          </a:p>
+        </p:txBody>
+      </p:sp>
+      <p:sp>
+        <p:nvSpPr>
+          <p:cNvPr id="6" name="Espace réservé du texte 5"/>
+          <p:cNvSpPr>
+            <a:spLocks noGrp="1"/>
+          </p:cNvSpPr>
+          <p:nvPr>
+            <p:ph type="body" sz="quarter" idx="3"/>
+          </p:nvPr>
+        </p:nvSpPr>
+        <p:spPr>
+          <a:xfrm>
+            <a:off x="2957265" y="2051785"/>
+            <a:ext cx="1789181" cy="576262"/>
+          </a:xfrm>
+        </p:spPr>
+        <p:txBody>
+          <a:bodyPr/>
+          <a:lstStyle/>
+          <a:p>
+            <a:pPr algn="ctr"/>
+            <a:r>
+              <a:rPr lang="en-US" sz="2000" dirty="0" smtClean="0"/>
+              <a:t>Back-End</a:t>
+            </a:r>
+            <a:endParaRPr lang="en-US" sz="2000" dirty="0"/>
+          </a:p>
+        </p:txBody>
+      </p:sp>
+      <p:sp>
+        <p:nvSpPr>
+          <p:cNvPr id="7" name="Espace réservé du contenu 6"/>
+          <p:cNvSpPr>
+            <a:spLocks noGrp="1"/>
+          </p:cNvSpPr>
+          <p:nvPr>
+            <p:ph sz="quarter" idx="4"/>
+          </p:nvPr>
+        </p:nvSpPr>
+        <p:spPr>
+          <a:xfrm>
+            <a:off x="2816462" y="2784151"/>
+            <a:ext cx="1918990" cy="2665259"/>
+          </a:xfrm>
+          <a:ln>
+            <a:solidFill>
+              <a:schemeClr val="tx1"/>
+            </a:solidFill>
+          </a:ln>
+        </p:spPr>
+        <p:txBody>
+          <a:bodyPr>
+            <a:normAutofit/>
+          </a:bodyPr>
+          <a:lstStyle/>
+          <a:p>
+            <a:r>
+              <a:rPr lang="en-US" sz="2000" dirty="0" smtClean="0"/>
+              <a:t>Functions:</a:t>
+            </a:r>
+          </a:p>
+          <a:p>
+            <a:r>
+              <a:rPr lang="en-US" sz="1400" dirty="0" smtClean="0"/>
+              <a:t>Manage orders</a:t>
+            </a:r>
+          </a:p>
+          <a:p>
+            <a:r>
+              <a:rPr lang="en-US" sz="1400" dirty="0" smtClean="0"/>
+              <a:t>Manage</a:t>
+            </a:r>
+            <a:r>
+              <a:rPr lang="en-US" sz="1400" dirty="0"/>
+              <a:t> </a:t>
+            </a:r>
+            <a:r>
+              <a:rPr lang="en-US" sz="1400" dirty="0" smtClean="0"/>
+              <a:t>customers</a:t>
+            </a:r>
+          </a:p>
+          <a:p>
+            <a:r>
+              <a:rPr lang="en-US" sz="1400" dirty="0" smtClean="0"/>
+              <a:t>Manage catalog</a:t>
+            </a:r>
+          </a:p>
+        </p:txBody>
+      </p:sp>
+      <p:sp>
+        <p:nvSpPr>
+          <p:cNvPr id="12" name="Espace réservé du texte 5"/>
+          <p:cNvSpPr txBox="1">
+            <a:spLocks/>
+          </p:cNvSpPr>
+          <p:nvPr/>
+        </p:nvSpPr>
+        <p:spPr>
+          <a:xfrm>
+            <a:off x="5053673" y="2051785"/>
+            <a:ext cx="1789181" cy="576262"/>
+          </a:xfrm>
+          <a:prstGeom prst="rect">
+            <a:avLst/>
+          </a:prstGeom>
+        </p:spPr>
+        <p:txBody>
+          <a:bodyPr vert="horz" lIns="91440" tIns="45720" rIns="91440" bIns="45720" rtlCol="0" anchor="b">
+            <a:noAutofit/>
+          </a:bodyPr>
+          <a:lstStyle>
+            <a:lvl1pPr marL="0" indent="0" algn="l" defTabSz="457200" rtl="0" eaLnBrk="1" latinLnBrk="0" hangingPunct="1">
+              <a:spcBef>
+                <a:spcPct val="20000"/>
+              </a:spcBef>
+              <a:spcAft>
+                <a:spcPts val="600"/>
+              </a:spcAft>
+              <a:buClr>
+                <a:schemeClr val="accent1">
+                  <a:lumMod val="75000"/>
+                </a:schemeClr>
+              </a:buClr>
+              <a:buSzPct val="145000"/>
+              <a:buFont typeface="Arial"/>
+              <a:buNone/>
+              <a:defRPr sz="2800" b="0" kern="1200" cap="none">
+                <a:solidFill>
+                  <a:schemeClr val="accent1">
+                    <a:lumMod val="75000"/>
+                  </a:schemeClr>
+                </a:solidFill>
+                <a:effectLst/>
+                <a:latin typeface="+mn-lt"/>
+                <a:ea typeface="+mn-ea"/>
+                <a:cs typeface="+mn-cs"/>
+              </a:defRPr>
+            </a:lvl1pPr>
+            <a:lvl2pPr marL="457200" indent="0" algn="l" defTabSz="457200" rtl="0" eaLnBrk="1" latinLnBrk="0" hangingPunct="1">
+              <a:spcBef>
+                <a:spcPct val="20000"/>
+              </a:spcBef>
+              <a:spcAft>
+                <a:spcPts val="600"/>
+              </a:spcAft>
+              <a:buClr>
+                <a:schemeClr val="accent1">
+                  <a:lumMod val="75000"/>
+                </a:schemeClr>
+              </a:buClr>
+              <a:buSzPct val="145000"/>
+              <a:buFont typeface="Arial"/>
+              <a:buNone/>
+              <a:defRPr sz="2000" b="1" kern="1200" cap="none">
+                <a:solidFill>
+                  <a:schemeClr val="tx1"/>
+                </a:solidFill>
+                <a:effectLst/>
+                <a:latin typeface="+mn-lt"/>
+                <a:ea typeface="+mn-ea"/>
+                <a:cs typeface="+mn-cs"/>
+              </a:defRPr>
+            </a:lvl2pPr>
+            <a:lvl3pPr marL="914400" indent="0" algn="l" defTabSz="457200" rtl="0" eaLnBrk="1" latinLnBrk="0" hangingPunct="1">
+              <a:spcBef>
+                <a:spcPct val="20000"/>
+              </a:spcBef>
+              <a:spcAft>
+                <a:spcPts val="600"/>
+              </a:spcAft>
+              <a:buClr>
+                <a:schemeClr val="accent1">
+                  <a:lumMod val="75000"/>
+                </a:schemeClr>
+              </a:buClr>
+              <a:buSzPct val="145000"/>
+              <a:buFont typeface="Arial"/>
+              <a:buNone/>
+              <a:defRPr sz="1800" b="1" kern="1200" cap="none">
+                <a:solidFill>
+                  <a:schemeClr val="tx1"/>
+                </a:solidFill>
+                <a:effectLst/>
+                <a:latin typeface="+mn-lt"/>
+                <a:ea typeface="+mn-ea"/>
+                <a:cs typeface="+mn-cs"/>
+              </a:defRPr>
+            </a:lvl3pPr>
+            <a:lvl4pPr marL="1371600" indent="0" algn="l" defTabSz="457200" rtl="0" eaLnBrk="1" latinLnBrk="0" hangingPunct="1">
+              <a:spcBef>
+                <a:spcPct val="20000"/>
+              </a:spcBef>
+              <a:spcAft>
+                <a:spcPts val="600"/>
+              </a:spcAft>
+              <a:buClr>
+                <a:schemeClr val="accent1">
+                  <a:lumMod val="75000"/>
+                </a:schemeClr>
+              </a:buClr>
+              <a:buSzPct val="145000"/>
+              <a:buFont typeface="Arial"/>
+              <a:buNone/>
+              <a:defRPr sz="1600" b="1" kern="1200" cap="none">
+                <a:solidFill>
+                  <a:schemeClr val="tx1"/>
+                </a:solidFill>
+                <a:effectLst/>
+                <a:latin typeface="+mn-lt"/>
+                <a:ea typeface="+mn-ea"/>
+                <a:cs typeface="+mn-cs"/>
+              </a:defRPr>
+            </a:lvl4pPr>
+            <a:lvl5pPr marL="1828800" indent="0" algn="l" defTabSz="457200" rtl="0" eaLnBrk="1" latinLnBrk="0" hangingPunct="1">
+              <a:spcBef>
+                <a:spcPct val="20000"/>
+              </a:spcBef>
+              <a:spcAft>
+                <a:spcPts val="600"/>
+              </a:spcAft>
+              <a:buClr>
+                <a:schemeClr val="accent1">
+                  <a:lumMod val="75000"/>
+                </a:schemeClr>
+              </a:buClr>
+              <a:buSzPct val="145000"/>
+              <a:buFont typeface="Arial"/>
+              <a:buNone/>
+              <a:defRPr sz="1600" b="1" kern="1200" cap="none">
+                <a:solidFill>
+                  <a:schemeClr val="tx1"/>
+                </a:solidFill>
+                <a:effectLst/>
+                <a:latin typeface="+mn-lt"/>
+                <a:ea typeface="+mn-ea"/>
+                <a:cs typeface="+mn-cs"/>
+              </a:defRPr>
+            </a:lvl5pPr>
+            <a:lvl6pPr marL="2286000" indent="0" algn="l" defTabSz="457200" rtl="0" eaLnBrk="1" latinLnBrk="0" hangingPunct="1">
+              <a:spcBef>
+                <a:spcPct val="20000"/>
+              </a:spcBef>
+              <a:spcAft>
+                <a:spcPts val="600"/>
+              </a:spcAft>
+              <a:buClr>
+                <a:schemeClr val="accent1">
+                  <a:lumMod val="75000"/>
+                </a:schemeClr>
+              </a:buClr>
+              <a:buSzPct val="145000"/>
+              <a:buFont typeface="Arial"/>
+              <a:buNone/>
+              <a:defRPr sz="1600" b="1" kern="1200" cap="none">
+                <a:solidFill>
+                  <a:schemeClr val="tx1"/>
+                </a:solidFill>
+                <a:effectLst/>
+                <a:latin typeface="+mn-lt"/>
+                <a:ea typeface="+mn-ea"/>
+                <a:cs typeface="+mn-cs"/>
+              </a:defRPr>
+            </a:lvl6pPr>
+            <a:lvl7pPr marL="2743200" indent="0" algn="l" defTabSz="457200" rtl="0" eaLnBrk="1" latinLnBrk="0" hangingPunct="1">
+              <a:spcBef>
+                <a:spcPct val="20000"/>
+              </a:spcBef>
+              <a:spcAft>
+                <a:spcPts val="600"/>
+              </a:spcAft>
+              <a:buClr>
+                <a:schemeClr val="accent1">
+                  <a:lumMod val="75000"/>
+                </a:schemeClr>
+              </a:buClr>
+              <a:buSzPct val="145000"/>
+              <a:buFont typeface="Arial"/>
+              <a:buNone/>
+              <a:defRPr sz="1600" b="1" kern="1200" cap="none">
+                <a:solidFill>
+                  <a:schemeClr val="tx1"/>
+                </a:solidFill>
+                <a:effectLst/>
+                <a:latin typeface="+mn-lt"/>
+                <a:ea typeface="+mn-ea"/>
+                <a:cs typeface="+mn-cs"/>
+              </a:defRPr>
+            </a:lvl7pPr>
+            <a:lvl8pPr marL="3200400" indent="0" algn="l" defTabSz="457200" rtl="0" eaLnBrk="1" latinLnBrk="0" hangingPunct="1">
+              <a:spcBef>
+                <a:spcPct val="20000"/>
+              </a:spcBef>
+              <a:spcAft>
+                <a:spcPts val="600"/>
+              </a:spcAft>
+              <a:buClr>
+                <a:schemeClr val="accent1">
+                  <a:lumMod val="75000"/>
+                </a:schemeClr>
+              </a:buClr>
+              <a:buSzPct val="145000"/>
+              <a:buFont typeface="Arial"/>
+              <a:buNone/>
+              <a:defRPr sz="1600" b="1" kern="1200" cap="none">
+                <a:solidFill>
+                  <a:schemeClr val="tx1"/>
+                </a:solidFill>
+                <a:effectLst/>
+                <a:latin typeface="+mn-lt"/>
+                <a:ea typeface="+mn-ea"/>
+                <a:cs typeface="+mn-cs"/>
+              </a:defRPr>
+            </a:lvl8pPr>
+            <a:lvl9pPr marL="3657600" indent="0" algn="l" defTabSz="457200" rtl="0" eaLnBrk="1" latinLnBrk="0" hangingPunct="1">
+              <a:spcBef>
+                <a:spcPct val="20000"/>
+              </a:spcBef>
+              <a:spcAft>
+                <a:spcPts val="600"/>
+              </a:spcAft>
+              <a:buClr>
+                <a:schemeClr val="accent1">
+                  <a:lumMod val="75000"/>
+                </a:schemeClr>
+              </a:buClr>
+              <a:buSzPct val="145000"/>
+              <a:buFont typeface="Arial"/>
+              <a:buNone/>
+              <a:defRPr sz="1600" b="1" kern="1200" cap="none">
+                <a:solidFill>
+                  <a:schemeClr val="tx1"/>
+                </a:solidFill>
+                <a:effectLst/>
+                <a:latin typeface="+mn-lt"/>
+                <a:ea typeface="+mn-ea"/>
+                <a:cs typeface="+mn-cs"/>
+              </a:defRPr>
+            </a:lvl9pPr>
+          </a:lstStyle>
+          <a:p>
+            <a:pPr algn="ctr"/>
+            <a:r>
+              <a:rPr lang="en-US" sz="2000" dirty="0" smtClean="0"/>
+              <a:t>HTML/CSS</a:t>
+            </a:r>
+            <a:endParaRPr lang="en-US" sz="2000" dirty="0"/>
+          </a:p>
+        </p:txBody>
+      </p:sp>
+      <p:sp>
+        <p:nvSpPr>
+          <p:cNvPr id="13" name="Espace réservé du contenu 6"/>
+          <p:cNvSpPr txBox="1">
+            <a:spLocks/>
+          </p:cNvSpPr>
+          <p:nvPr/>
+        </p:nvSpPr>
+        <p:spPr>
+          <a:xfrm>
+            <a:off x="4918367" y="2784151"/>
+            <a:ext cx="1918990" cy="2665259"/>
+          </a:xfrm>
+          <a:prstGeom prst="rect">
+            <a:avLst/>
+          </a:prstGeom>
+          <a:ln>
+            <a:solidFill>
+              <a:schemeClr val="tx1"/>
+            </a:solidFill>
+          </a:ln>
+        </p:spPr>
+        <p:txBody>
+          <a:bodyPr vert="horz" lIns="91440" tIns="45720" rIns="91440" bIns="45720" rtlCol="0" anchor="t">
+            <a:normAutofit/>
+          </a:bodyPr>
+          <a:lstStyle>
+            <a:lvl1pPr marL="285750" indent="-285750" algn="l" defTabSz="457200" rtl="0" eaLnBrk="1" latinLnBrk="0" hangingPunct="1">
+              <a:spcBef>
+                <a:spcPct val="20000"/>
+              </a:spcBef>
+              <a:spcAft>
+                <a:spcPts val="600"/>
+              </a:spcAft>
+              <a:buClr>
+                <a:schemeClr val="accent1">
+                  <a:lumMod val="75000"/>
+                </a:schemeClr>
+              </a:buClr>
+              <a:buSzPct val="145000"/>
+              <a:buFont typeface="Arial"/>
+              <a:buChar char="•"/>
+              <a:defRPr sz="1800" kern="1200" cap="none">
+                <a:solidFill>
+                  <a:schemeClr val="tx1"/>
+                </a:solidFill>
+                <a:effectLst/>
+                <a:latin typeface="+mn-lt"/>
+                <a:ea typeface="+mn-ea"/>
+                <a:cs typeface="+mn-cs"/>
+              </a:defRPr>
+            </a:lvl1pPr>
+            <a:lvl2pPr marL="742950" indent="-285750" algn="l" defTabSz="457200" rtl="0" eaLnBrk="1" latinLnBrk="0" hangingPunct="1">
+              <a:spcBef>
+                <a:spcPct val="20000"/>
+              </a:spcBef>
+              <a:spcAft>
+                <a:spcPts val="600"/>
+              </a:spcAft>
+              <a:buClr>
+                <a:schemeClr val="accent1">
+                  <a:lumMod val="75000"/>
+                </a:schemeClr>
+              </a:buClr>
+              <a:buSzPct val="145000"/>
+              <a:buFont typeface="Arial"/>
+              <a:buChar char="•"/>
+              <a:defRPr sz="1600" kern="1200" cap="none">
+                <a:solidFill>
+                  <a:schemeClr val="tx1"/>
+                </a:solidFill>
+                <a:effectLst/>
+                <a:latin typeface="+mn-lt"/>
+                <a:ea typeface="+mn-ea"/>
+                <a:cs typeface="+mn-cs"/>
+              </a:defRPr>
+            </a:lvl2pPr>
+            <a:lvl3pPr marL="1200150" indent="-285750" algn="l" defTabSz="457200" rtl="0" eaLnBrk="1" latinLnBrk="0" hangingPunct="1">
+              <a:spcBef>
+                <a:spcPct val="20000"/>
+              </a:spcBef>
+              <a:spcAft>
+                <a:spcPts val="600"/>
+              </a:spcAft>
+              <a:buClr>
+                <a:schemeClr val="accent1">
+                  <a:lumMod val="75000"/>
+                </a:schemeClr>
+              </a:buClr>
+              <a:buSzPct val="145000"/>
+              <a:buFont typeface="Arial"/>
+              <a:buChar char="•"/>
+              <a:defRPr sz="1400" kern="1200" cap="none">
+                <a:solidFill>
+                  <a:schemeClr val="tx1"/>
+                </a:solidFill>
+                <a:effectLst/>
+                <a:latin typeface="+mn-lt"/>
+                <a:ea typeface="+mn-ea"/>
+                <a:cs typeface="+mn-cs"/>
+              </a:defRPr>
+            </a:lvl3pPr>
+            <a:lvl4pPr marL="1543050" indent="-171450" algn="l" defTabSz="457200" rtl="0" eaLnBrk="1" latinLnBrk="0" hangingPunct="1">
+              <a:spcBef>
+                <a:spcPct val="20000"/>
+              </a:spcBef>
+              <a:spcAft>
+                <a:spcPts val="600"/>
+              </a:spcAft>
+              <a:buClr>
+                <a:schemeClr val="accent1">
+                  <a:lumMod val="75000"/>
+                </a:schemeClr>
+              </a:buClr>
+              <a:buSzPct val="145000"/>
+              <a:buFont typeface="Arial"/>
+              <a:buChar char="•"/>
+              <a:defRPr sz="1200" kern="1200" cap="none">
+                <a:solidFill>
+                  <a:schemeClr val="tx1"/>
+                </a:solidFill>
+                <a:effectLst/>
+                <a:latin typeface="+mn-lt"/>
+                <a:ea typeface="+mn-ea"/>
+                <a:cs typeface="+mn-cs"/>
+              </a:defRPr>
+            </a:lvl4pPr>
+            <a:lvl5pPr marL="2000250" indent="-171450" algn="l" defTabSz="457200" rtl="0" eaLnBrk="1" latinLnBrk="0" hangingPunct="1">
+              <a:spcBef>
+                <a:spcPct val="20000"/>
+              </a:spcBef>
+              <a:spcAft>
+                <a:spcPts val="600"/>
+              </a:spcAft>
+              <a:buClr>
+                <a:schemeClr val="accent1">
+                  <a:lumMod val="75000"/>
+                </a:schemeClr>
+              </a:buClr>
+              <a:buSzPct val="145000"/>
+              <a:buFont typeface="Arial"/>
+              <a:buChar char="•"/>
+              <a:defRPr sz="1200" kern="1200" cap="none">
+                <a:solidFill>
+                  <a:schemeClr val="tx1"/>
+                </a:solidFill>
+                <a:effectLst/>
+                <a:latin typeface="+mn-lt"/>
+                <a:ea typeface="+mn-ea"/>
+                <a:cs typeface="+mn-cs"/>
+              </a:defRPr>
+            </a:lvl5pPr>
+            <a:lvl6pPr marL="2514600" indent="-228600" algn="l" defTabSz="457200" rtl="0" eaLnBrk="1" latinLnBrk="0" hangingPunct="1">
+              <a:spcBef>
+                <a:spcPct val="20000"/>
+              </a:spcBef>
+              <a:spcAft>
+                <a:spcPts val="600"/>
+              </a:spcAft>
+              <a:buClr>
+                <a:schemeClr val="accent1">
+                  <a:lumMod val="75000"/>
+                </a:schemeClr>
+              </a:buClr>
+              <a:buSzPct val="145000"/>
+              <a:buFont typeface="Arial"/>
+              <a:buChar char="•"/>
+              <a:defRPr sz="1200" kern="1200" cap="none">
+                <a:solidFill>
+                  <a:schemeClr val="tx1"/>
+                </a:solidFill>
+                <a:effectLst/>
+                <a:latin typeface="+mn-lt"/>
+                <a:ea typeface="+mn-ea"/>
+                <a:cs typeface="+mn-cs"/>
+              </a:defRPr>
+            </a:lvl6pPr>
+            <a:lvl7pPr marL="2971800" indent="-228600" algn="l" defTabSz="457200" rtl="0" eaLnBrk="1" latinLnBrk="0" hangingPunct="1">
+              <a:spcBef>
+                <a:spcPct val="20000"/>
+              </a:spcBef>
+              <a:spcAft>
+                <a:spcPts val="600"/>
+              </a:spcAft>
+              <a:buClr>
+                <a:schemeClr val="accent1">
+                  <a:lumMod val="75000"/>
+                </a:schemeClr>
+              </a:buClr>
+              <a:buSzPct val="145000"/>
+              <a:buFont typeface="Arial"/>
+              <a:buChar char="•"/>
+              <a:defRPr sz="1200" kern="1200" cap="none">
+                <a:solidFill>
+                  <a:schemeClr val="tx1"/>
+                </a:solidFill>
+                <a:effectLst/>
+                <a:latin typeface="+mn-lt"/>
+                <a:ea typeface="+mn-ea"/>
+                <a:cs typeface="+mn-cs"/>
+              </a:defRPr>
+            </a:lvl7pPr>
+            <a:lvl8pPr marL="3429000" indent="-228600" algn="l" defTabSz="457200" rtl="0" eaLnBrk="1" latinLnBrk="0" hangingPunct="1">
+              <a:spcBef>
+                <a:spcPct val="20000"/>
+              </a:spcBef>
+              <a:spcAft>
+                <a:spcPts val="600"/>
+              </a:spcAft>
+              <a:buClr>
+                <a:schemeClr val="accent1">
+                  <a:lumMod val="75000"/>
+                </a:schemeClr>
+              </a:buClr>
+              <a:buSzPct val="145000"/>
+              <a:buFont typeface="Arial"/>
+              <a:buChar char="•"/>
+              <a:defRPr sz="1200" kern="1200" cap="none">
+                <a:solidFill>
+                  <a:schemeClr val="tx1"/>
+                </a:solidFill>
+                <a:effectLst/>
+                <a:latin typeface="+mn-lt"/>
+                <a:ea typeface="+mn-ea"/>
+                <a:cs typeface="+mn-cs"/>
+              </a:defRPr>
+            </a:lvl8pPr>
+            <a:lvl9pPr marL="3886200" indent="-228600" algn="l" defTabSz="457200" rtl="0" eaLnBrk="1" latinLnBrk="0" hangingPunct="1">
+              <a:spcBef>
+                <a:spcPct val="20000"/>
+              </a:spcBef>
+              <a:spcAft>
+                <a:spcPts val="600"/>
+              </a:spcAft>
+              <a:buClr>
+                <a:schemeClr val="accent1">
+                  <a:lumMod val="75000"/>
+                </a:schemeClr>
+              </a:buClr>
+              <a:buSzPct val="145000"/>
+              <a:buFont typeface="Arial"/>
+              <a:buChar char="•"/>
+              <a:defRPr sz="1200" kern="1200" cap="none">
+                <a:solidFill>
+                  <a:schemeClr val="tx1"/>
+                </a:solidFill>
+                <a:effectLst/>
+                <a:latin typeface="+mn-lt"/>
+                <a:ea typeface="+mn-ea"/>
+                <a:cs typeface="+mn-cs"/>
+              </a:defRPr>
+            </a:lvl9pPr>
+          </a:lstStyle>
+          <a:p>
+            <a:r>
+              <a:rPr lang="en-US" sz="2000" dirty="0" smtClean="0"/>
+              <a:t>Display:</a:t>
+            </a:r>
+          </a:p>
+          <a:p>
+            <a:r>
+              <a:rPr lang="en-US" sz="1400" dirty="0" smtClean="0"/>
+              <a:t>Responsive design</a:t>
+            </a:r>
+          </a:p>
+          <a:p>
+            <a:r>
+              <a:rPr lang="en-US" sz="1400" dirty="0" smtClean="0"/>
+              <a:t>Friendly-user Interface</a:t>
+            </a:r>
+            <a:endParaRPr lang="en-US" sz="1400" dirty="0"/>
+          </a:p>
+          <a:p>
+            <a:endParaRPr lang="en-US" sz="1400" dirty="0" smtClean="0"/>
+          </a:p>
+        </p:txBody>
+      </p:sp>
+      <p:sp>
+        <p:nvSpPr>
+          <p:cNvPr id="17" name="Espace réservé du texte 5"/>
+          <p:cNvSpPr txBox="1">
+            <a:spLocks/>
+          </p:cNvSpPr>
+          <p:nvPr/>
+        </p:nvSpPr>
+        <p:spPr>
+          <a:xfrm>
+            <a:off x="7150081" y="2051785"/>
+            <a:ext cx="1789181" cy="576262"/>
+          </a:xfrm>
+          <a:prstGeom prst="rect">
+            <a:avLst/>
+          </a:prstGeom>
+        </p:spPr>
+        <p:txBody>
+          <a:bodyPr vert="horz" lIns="91440" tIns="45720" rIns="91440" bIns="45720" rtlCol="0" anchor="b">
+            <a:noAutofit/>
+          </a:bodyPr>
+          <a:lstStyle>
+            <a:lvl1pPr marL="0" indent="0" algn="l" defTabSz="457200" rtl="0" eaLnBrk="1" latinLnBrk="0" hangingPunct="1">
+              <a:spcBef>
+                <a:spcPct val="20000"/>
+              </a:spcBef>
+              <a:spcAft>
+                <a:spcPts val="600"/>
+              </a:spcAft>
+              <a:buClr>
+                <a:schemeClr val="accent1">
+                  <a:lumMod val="75000"/>
+                </a:schemeClr>
+              </a:buClr>
+              <a:buSzPct val="145000"/>
+              <a:buFont typeface="Arial"/>
+              <a:buNone/>
+              <a:defRPr sz="2800" b="0" kern="1200" cap="none">
+                <a:solidFill>
+                  <a:schemeClr val="accent1">
+                    <a:lumMod val="75000"/>
+                  </a:schemeClr>
+                </a:solidFill>
+                <a:effectLst/>
+                <a:latin typeface="+mn-lt"/>
+                <a:ea typeface="+mn-ea"/>
+                <a:cs typeface="+mn-cs"/>
+              </a:defRPr>
+            </a:lvl1pPr>
+            <a:lvl2pPr marL="457200" indent="0" algn="l" defTabSz="457200" rtl="0" eaLnBrk="1" latinLnBrk="0" hangingPunct="1">
+              <a:spcBef>
+                <a:spcPct val="20000"/>
+              </a:spcBef>
+              <a:spcAft>
+                <a:spcPts val="600"/>
+              </a:spcAft>
+              <a:buClr>
+                <a:schemeClr val="accent1">
+                  <a:lumMod val="75000"/>
+                </a:schemeClr>
+              </a:buClr>
+              <a:buSzPct val="145000"/>
+              <a:buFont typeface="Arial"/>
+              <a:buNone/>
+              <a:defRPr sz="2000" b="1" kern="1200" cap="none">
+                <a:solidFill>
+                  <a:schemeClr val="tx1"/>
+                </a:solidFill>
+                <a:effectLst/>
+                <a:latin typeface="+mn-lt"/>
+                <a:ea typeface="+mn-ea"/>
+                <a:cs typeface="+mn-cs"/>
+              </a:defRPr>
+            </a:lvl2pPr>
+            <a:lvl3pPr marL="914400" indent="0" algn="l" defTabSz="457200" rtl="0" eaLnBrk="1" latinLnBrk="0" hangingPunct="1">
+              <a:spcBef>
+                <a:spcPct val="20000"/>
+              </a:spcBef>
+              <a:spcAft>
+                <a:spcPts val="600"/>
+              </a:spcAft>
+              <a:buClr>
+                <a:schemeClr val="accent1">
+                  <a:lumMod val="75000"/>
+                </a:schemeClr>
+              </a:buClr>
+              <a:buSzPct val="145000"/>
+              <a:buFont typeface="Arial"/>
+              <a:buNone/>
+              <a:defRPr sz="1800" b="1" kern="1200" cap="none">
+                <a:solidFill>
+                  <a:schemeClr val="tx1"/>
+                </a:solidFill>
+                <a:effectLst/>
+                <a:latin typeface="+mn-lt"/>
+                <a:ea typeface="+mn-ea"/>
+                <a:cs typeface="+mn-cs"/>
+              </a:defRPr>
+            </a:lvl3pPr>
+            <a:lvl4pPr marL="1371600" indent="0" algn="l" defTabSz="457200" rtl="0" eaLnBrk="1" latinLnBrk="0" hangingPunct="1">
+              <a:spcBef>
+                <a:spcPct val="20000"/>
+              </a:spcBef>
+              <a:spcAft>
+                <a:spcPts val="600"/>
+              </a:spcAft>
+              <a:buClr>
+                <a:schemeClr val="accent1">
+                  <a:lumMod val="75000"/>
+                </a:schemeClr>
+              </a:buClr>
+              <a:buSzPct val="145000"/>
+              <a:buFont typeface="Arial"/>
+              <a:buNone/>
+              <a:defRPr sz="1600" b="1" kern="1200" cap="none">
+                <a:solidFill>
+                  <a:schemeClr val="tx1"/>
+                </a:solidFill>
+                <a:effectLst/>
+                <a:latin typeface="+mn-lt"/>
+                <a:ea typeface="+mn-ea"/>
+                <a:cs typeface="+mn-cs"/>
+              </a:defRPr>
+            </a:lvl4pPr>
+            <a:lvl5pPr marL="1828800" indent="0" algn="l" defTabSz="457200" rtl="0" eaLnBrk="1" latinLnBrk="0" hangingPunct="1">
+              <a:spcBef>
+                <a:spcPct val="20000"/>
+              </a:spcBef>
+              <a:spcAft>
+                <a:spcPts val="600"/>
+              </a:spcAft>
+              <a:buClr>
+                <a:schemeClr val="accent1">
+                  <a:lumMod val="75000"/>
+                </a:schemeClr>
+              </a:buClr>
+              <a:buSzPct val="145000"/>
+              <a:buFont typeface="Arial"/>
+              <a:buNone/>
+              <a:defRPr sz="1600" b="1" kern="1200" cap="none">
+                <a:solidFill>
+                  <a:schemeClr val="tx1"/>
+                </a:solidFill>
+                <a:effectLst/>
+                <a:latin typeface="+mn-lt"/>
+                <a:ea typeface="+mn-ea"/>
+                <a:cs typeface="+mn-cs"/>
+              </a:defRPr>
+            </a:lvl5pPr>
+            <a:lvl6pPr marL="2286000" indent="0" algn="l" defTabSz="457200" rtl="0" eaLnBrk="1" latinLnBrk="0" hangingPunct="1">
+              <a:spcBef>
+                <a:spcPct val="20000"/>
+              </a:spcBef>
+              <a:spcAft>
+                <a:spcPts val="600"/>
+              </a:spcAft>
+              <a:buClr>
+                <a:schemeClr val="accent1">
+                  <a:lumMod val="75000"/>
+                </a:schemeClr>
+              </a:buClr>
+              <a:buSzPct val="145000"/>
+              <a:buFont typeface="Arial"/>
+              <a:buNone/>
+              <a:defRPr sz="1600" b="1" kern="1200" cap="none">
+                <a:solidFill>
+                  <a:schemeClr val="tx1"/>
+                </a:solidFill>
+                <a:effectLst/>
+                <a:latin typeface="+mn-lt"/>
+                <a:ea typeface="+mn-ea"/>
+                <a:cs typeface="+mn-cs"/>
+              </a:defRPr>
+            </a:lvl6pPr>
+            <a:lvl7pPr marL="2743200" indent="0" algn="l" defTabSz="457200" rtl="0" eaLnBrk="1" latinLnBrk="0" hangingPunct="1">
+              <a:spcBef>
+                <a:spcPct val="20000"/>
+              </a:spcBef>
+              <a:spcAft>
+                <a:spcPts val="600"/>
+              </a:spcAft>
+              <a:buClr>
+                <a:schemeClr val="accent1">
+                  <a:lumMod val="75000"/>
+                </a:schemeClr>
+              </a:buClr>
+              <a:buSzPct val="145000"/>
+              <a:buFont typeface="Arial"/>
+              <a:buNone/>
+              <a:defRPr sz="1600" b="1" kern="1200" cap="none">
+                <a:solidFill>
+                  <a:schemeClr val="tx1"/>
+                </a:solidFill>
+                <a:effectLst/>
+                <a:latin typeface="+mn-lt"/>
+                <a:ea typeface="+mn-ea"/>
+                <a:cs typeface="+mn-cs"/>
+              </a:defRPr>
+            </a:lvl7pPr>
+            <a:lvl8pPr marL="3200400" indent="0" algn="l" defTabSz="457200" rtl="0" eaLnBrk="1" latinLnBrk="0" hangingPunct="1">
+              <a:spcBef>
+                <a:spcPct val="20000"/>
+              </a:spcBef>
+              <a:spcAft>
+                <a:spcPts val="600"/>
+              </a:spcAft>
+              <a:buClr>
+                <a:schemeClr val="accent1">
+                  <a:lumMod val="75000"/>
+                </a:schemeClr>
+              </a:buClr>
+              <a:buSzPct val="145000"/>
+              <a:buFont typeface="Arial"/>
+              <a:buNone/>
+              <a:defRPr sz="1600" b="1" kern="1200" cap="none">
+                <a:solidFill>
+                  <a:schemeClr val="tx1"/>
+                </a:solidFill>
+                <a:effectLst/>
+                <a:latin typeface="+mn-lt"/>
+                <a:ea typeface="+mn-ea"/>
+                <a:cs typeface="+mn-cs"/>
+              </a:defRPr>
+            </a:lvl8pPr>
+            <a:lvl9pPr marL="3657600" indent="0" algn="l" defTabSz="457200" rtl="0" eaLnBrk="1" latinLnBrk="0" hangingPunct="1">
+              <a:spcBef>
+                <a:spcPct val="20000"/>
+              </a:spcBef>
+              <a:spcAft>
+                <a:spcPts val="600"/>
+              </a:spcAft>
+              <a:buClr>
+                <a:schemeClr val="accent1">
+                  <a:lumMod val="75000"/>
+                </a:schemeClr>
+              </a:buClr>
+              <a:buSzPct val="145000"/>
+              <a:buFont typeface="Arial"/>
+              <a:buNone/>
+              <a:defRPr sz="1600" b="1" kern="1200" cap="none">
+                <a:solidFill>
+                  <a:schemeClr val="tx1"/>
+                </a:solidFill>
+                <a:effectLst/>
+                <a:latin typeface="+mn-lt"/>
+                <a:ea typeface="+mn-ea"/>
+                <a:cs typeface="+mn-cs"/>
+              </a:defRPr>
+            </a:lvl9pPr>
+          </a:lstStyle>
+          <a:p>
+            <a:pPr algn="ctr"/>
+            <a:r>
+              <a:rPr lang="en-US" sz="2000" dirty="0" smtClean="0"/>
+              <a:t>SQL/Database</a:t>
+            </a:r>
+            <a:endParaRPr lang="en-US" sz="2000" dirty="0"/>
+          </a:p>
+        </p:txBody>
+      </p:sp>
+      <p:sp>
+        <p:nvSpPr>
+          <p:cNvPr id="18" name="Espace réservé du contenu 6"/>
+          <p:cNvSpPr txBox="1">
+            <a:spLocks/>
+          </p:cNvSpPr>
+          <p:nvPr/>
+        </p:nvSpPr>
+        <p:spPr>
+          <a:xfrm>
+            <a:off x="7020272" y="2780928"/>
+            <a:ext cx="1918990" cy="2665259"/>
+          </a:xfrm>
+          <a:prstGeom prst="rect">
+            <a:avLst/>
+          </a:prstGeom>
+          <a:ln>
+            <a:solidFill>
+              <a:schemeClr val="tx1"/>
+            </a:solidFill>
+          </a:ln>
+        </p:spPr>
+        <p:txBody>
+          <a:bodyPr vert="horz" lIns="91440" tIns="45720" rIns="91440" bIns="45720" rtlCol="0" anchor="t">
+            <a:normAutofit/>
+          </a:bodyPr>
+          <a:lstStyle>
+            <a:lvl1pPr marL="285750" indent="-285750" algn="l" defTabSz="457200" rtl="0" eaLnBrk="1" latinLnBrk="0" hangingPunct="1">
+              <a:spcBef>
+                <a:spcPct val="20000"/>
+              </a:spcBef>
+              <a:spcAft>
+                <a:spcPts val="600"/>
+              </a:spcAft>
+              <a:buClr>
+                <a:schemeClr val="accent1">
+                  <a:lumMod val="75000"/>
+                </a:schemeClr>
+              </a:buClr>
+              <a:buSzPct val="145000"/>
+              <a:buFont typeface="Arial"/>
+              <a:buChar char="•"/>
+              <a:defRPr sz="1800" kern="1200" cap="none">
+                <a:solidFill>
+                  <a:schemeClr val="tx1"/>
+                </a:solidFill>
+                <a:effectLst/>
+                <a:latin typeface="+mn-lt"/>
+                <a:ea typeface="+mn-ea"/>
+                <a:cs typeface="+mn-cs"/>
+              </a:defRPr>
+            </a:lvl1pPr>
+            <a:lvl2pPr marL="742950" indent="-285750" algn="l" defTabSz="457200" rtl="0" eaLnBrk="1" latinLnBrk="0" hangingPunct="1">
+              <a:spcBef>
+                <a:spcPct val="20000"/>
+              </a:spcBef>
+              <a:spcAft>
+                <a:spcPts val="600"/>
+              </a:spcAft>
+              <a:buClr>
+                <a:schemeClr val="accent1">
+                  <a:lumMod val="75000"/>
+                </a:schemeClr>
+              </a:buClr>
+              <a:buSzPct val="145000"/>
+              <a:buFont typeface="Arial"/>
+              <a:buChar char="•"/>
+              <a:defRPr sz="1600" kern="1200" cap="none">
+                <a:solidFill>
+                  <a:schemeClr val="tx1"/>
+                </a:solidFill>
+                <a:effectLst/>
+                <a:latin typeface="+mn-lt"/>
+                <a:ea typeface="+mn-ea"/>
+                <a:cs typeface="+mn-cs"/>
+              </a:defRPr>
+            </a:lvl2pPr>
+            <a:lvl3pPr marL="1200150" indent="-285750" algn="l" defTabSz="457200" rtl="0" eaLnBrk="1" latinLnBrk="0" hangingPunct="1">
+              <a:spcBef>
+                <a:spcPct val="20000"/>
+              </a:spcBef>
+              <a:spcAft>
+                <a:spcPts val="600"/>
+              </a:spcAft>
+              <a:buClr>
+                <a:schemeClr val="accent1">
+                  <a:lumMod val="75000"/>
+                </a:schemeClr>
+              </a:buClr>
+              <a:buSzPct val="145000"/>
+              <a:buFont typeface="Arial"/>
+              <a:buChar char="•"/>
+              <a:defRPr sz="1400" kern="1200" cap="none">
+                <a:solidFill>
+                  <a:schemeClr val="tx1"/>
+                </a:solidFill>
+                <a:effectLst/>
+                <a:latin typeface="+mn-lt"/>
+                <a:ea typeface="+mn-ea"/>
+                <a:cs typeface="+mn-cs"/>
+              </a:defRPr>
+            </a:lvl3pPr>
+            <a:lvl4pPr marL="1543050" indent="-171450" algn="l" defTabSz="457200" rtl="0" eaLnBrk="1" latinLnBrk="0" hangingPunct="1">
+              <a:spcBef>
+                <a:spcPct val="20000"/>
+              </a:spcBef>
+              <a:spcAft>
+                <a:spcPts val="600"/>
+              </a:spcAft>
+              <a:buClr>
+                <a:schemeClr val="accent1">
+                  <a:lumMod val="75000"/>
+                </a:schemeClr>
+              </a:buClr>
+              <a:buSzPct val="145000"/>
+              <a:buFont typeface="Arial"/>
+              <a:buChar char="•"/>
+              <a:defRPr sz="1200" kern="1200" cap="none">
+                <a:solidFill>
+                  <a:schemeClr val="tx1"/>
+                </a:solidFill>
+                <a:effectLst/>
+                <a:latin typeface="+mn-lt"/>
+                <a:ea typeface="+mn-ea"/>
+                <a:cs typeface="+mn-cs"/>
+              </a:defRPr>
+            </a:lvl4pPr>
+            <a:lvl5pPr marL="2000250" indent="-171450" algn="l" defTabSz="457200" rtl="0" eaLnBrk="1" latinLnBrk="0" hangingPunct="1">
+              <a:spcBef>
+                <a:spcPct val="20000"/>
+              </a:spcBef>
+              <a:spcAft>
+                <a:spcPts val="600"/>
+              </a:spcAft>
+              <a:buClr>
+                <a:schemeClr val="accent1">
+                  <a:lumMod val="75000"/>
+                </a:schemeClr>
+              </a:buClr>
+              <a:buSzPct val="145000"/>
+              <a:buFont typeface="Arial"/>
+              <a:buChar char="•"/>
+              <a:defRPr sz="1200" kern="1200" cap="none">
+                <a:solidFill>
+                  <a:schemeClr val="tx1"/>
+                </a:solidFill>
+                <a:effectLst/>
+                <a:latin typeface="+mn-lt"/>
+                <a:ea typeface="+mn-ea"/>
+                <a:cs typeface="+mn-cs"/>
+              </a:defRPr>
+            </a:lvl5pPr>
+            <a:lvl6pPr marL="2514600" indent="-228600" algn="l" defTabSz="457200" rtl="0" eaLnBrk="1" latinLnBrk="0" hangingPunct="1">
+              <a:spcBef>
+                <a:spcPct val="20000"/>
+              </a:spcBef>
+              <a:spcAft>
+                <a:spcPts val="600"/>
+              </a:spcAft>
+              <a:buClr>
+                <a:schemeClr val="accent1">
+                  <a:lumMod val="75000"/>
+                </a:schemeClr>
+              </a:buClr>
+              <a:buSzPct val="145000"/>
+              <a:buFont typeface="Arial"/>
+              <a:buChar char="•"/>
+              <a:defRPr sz="1200" kern="1200" cap="none">
+                <a:solidFill>
+                  <a:schemeClr val="tx1"/>
+                </a:solidFill>
+                <a:effectLst/>
+                <a:latin typeface="+mn-lt"/>
+                <a:ea typeface="+mn-ea"/>
+                <a:cs typeface="+mn-cs"/>
+              </a:defRPr>
+            </a:lvl6pPr>
+            <a:lvl7pPr marL="2971800" indent="-228600" algn="l" defTabSz="457200" rtl="0" eaLnBrk="1" latinLnBrk="0" hangingPunct="1">
+              <a:spcBef>
+                <a:spcPct val="20000"/>
+              </a:spcBef>
+              <a:spcAft>
+                <a:spcPts val="600"/>
+              </a:spcAft>
+              <a:buClr>
+                <a:schemeClr val="accent1">
+                  <a:lumMod val="75000"/>
+                </a:schemeClr>
+              </a:buClr>
+              <a:buSzPct val="145000"/>
+              <a:buFont typeface="Arial"/>
+              <a:buChar char="•"/>
+              <a:defRPr sz="1200" kern="1200" cap="none">
+                <a:solidFill>
+                  <a:schemeClr val="tx1"/>
+                </a:solidFill>
+                <a:effectLst/>
+                <a:latin typeface="+mn-lt"/>
+                <a:ea typeface="+mn-ea"/>
+                <a:cs typeface="+mn-cs"/>
+              </a:defRPr>
+            </a:lvl7pPr>
+            <a:lvl8pPr marL="3429000" indent="-228600" algn="l" defTabSz="457200" rtl="0" eaLnBrk="1" latinLnBrk="0" hangingPunct="1">
+              <a:spcBef>
+                <a:spcPct val="20000"/>
+              </a:spcBef>
+              <a:spcAft>
+                <a:spcPts val="600"/>
+              </a:spcAft>
+              <a:buClr>
+                <a:schemeClr val="accent1">
+                  <a:lumMod val="75000"/>
+                </a:schemeClr>
+              </a:buClr>
+              <a:buSzPct val="145000"/>
+              <a:buFont typeface="Arial"/>
+              <a:buChar char="•"/>
+              <a:defRPr sz="1200" kern="1200" cap="none">
+                <a:solidFill>
+                  <a:schemeClr val="tx1"/>
+                </a:solidFill>
+                <a:effectLst/>
+                <a:latin typeface="+mn-lt"/>
+                <a:ea typeface="+mn-ea"/>
+                <a:cs typeface="+mn-cs"/>
+              </a:defRPr>
+            </a:lvl8pPr>
+            <a:lvl9pPr marL="3886200" indent="-228600" algn="l" defTabSz="457200" rtl="0" eaLnBrk="1" latinLnBrk="0" hangingPunct="1">
+              <a:spcBef>
+                <a:spcPct val="20000"/>
+              </a:spcBef>
+              <a:spcAft>
+                <a:spcPts val="600"/>
+              </a:spcAft>
+              <a:buClr>
+                <a:schemeClr val="accent1">
+                  <a:lumMod val="75000"/>
+                </a:schemeClr>
+              </a:buClr>
+              <a:buSzPct val="145000"/>
+              <a:buFont typeface="Arial"/>
+              <a:buChar char="•"/>
+              <a:defRPr sz="1200" kern="1200" cap="none">
+                <a:solidFill>
+                  <a:schemeClr val="tx1"/>
+                </a:solidFill>
+                <a:effectLst/>
+                <a:latin typeface="+mn-lt"/>
+                <a:ea typeface="+mn-ea"/>
+                <a:cs typeface="+mn-cs"/>
+              </a:defRPr>
+            </a:lvl9pPr>
+          </a:lstStyle>
+          <a:p>
+            <a:r>
+              <a:rPr lang="en-US" sz="2000" dirty="0" smtClean="0"/>
+              <a:t>Manage:</a:t>
+            </a:r>
+          </a:p>
+          <a:p>
+            <a:r>
+              <a:rPr lang="en-US" sz="1400" dirty="0" smtClean="0"/>
+              <a:t>Database</a:t>
+            </a:r>
+          </a:p>
+          <a:p>
+            <a:pPr marL="0" indent="0">
+              <a:buNone/>
+            </a:pPr>
+            <a:endParaRPr lang="en-US" dirty="0"/>
+          </a:p>
+        </p:txBody>
+      </p:sp>
+    </p:spTree>
+    <p:extLst>
+      <p:ext uri="{BB962C8B-B14F-4D97-AF65-F5344CB8AC3E}">
+        <p14:creationId xmlns:p14="http://schemas.microsoft.com/office/powerpoint/2010/main" val="181066778"/>
+      </p:ext>
+    </p:extLst>
+  </p:cSld>
+  <p:clrMapOvr>
+    <a:masterClrMapping/>
+  </p:clrMapOvr>
+</p:sld>
+</file>
+
+<file path=ppt/slides/slide7.xml><?xml version="1.0" encoding="utf-8"?>
 <p:sld xmlns:a="http://schemas.openxmlformats.org/drawingml/2006/main" xmlns:r="http://schemas.openxmlformats.org/officeDocument/2006/relationships" xmlns:p="http://schemas.openxmlformats.org/presentationml/2006/main">
   <p:cSld>
     <p:spTree>
@@ -11857,15 +13498,7 @@
           <a:p>
             <a:r>
               <a:rPr lang="fr-FR" dirty="0" smtClean="0"/>
-              <a:t>Sublime </a:t>
-            </a:r>
-            <a:r>
-              <a:rPr lang="fr-FR" dirty="0" err="1" smtClean="0"/>
-              <a:t>Text</a:t>
-            </a:r>
-            <a:r>
-              <a:rPr lang="fr-FR" dirty="0" smtClean="0"/>
-              <a:t> 3</a:t>
+              <a:t>Sublime Text 3</a:t>
             </a:r>
             <a:endParaRPr lang="fr-FR" dirty="0"/>
           </a:p>
@@ -11990,7 +13623,7 @@
           <a:lstStyle/>
           <a:p>
             <a:r>
-              <a:rPr lang="fr-FR" dirty="0" err="1" smtClean="0"/>
+              <a:rPr lang="fr-FR" dirty="0" smtClean="0"/>
               <a:t>Balasmiq</a:t>
             </a:r>
             <a:endParaRPr lang="fr-FR" dirty="0"/>
@@ -12053,7 +13686,7 @@
           <a:lstStyle/>
           <a:p>
             <a:r>
-              <a:rPr lang="fr-FR" dirty="0" err="1" smtClean="0"/>
+              <a:rPr lang="fr-FR" dirty="0" smtClean="0"/>
               <a:t>PowerAMC</a:t>
             </a:r>
             <a:endParaRPr lang="fr-FR" dirty="0"/>
@@ -12123,6 +13756,36 @@
           </a:p>
         </p:txBody>
       </p:sp>
+      <p:sp>
+        <p:nvSpPr>
+          <p:cNvPr id="2" name="ZoneTexte 1"/>
+          <p:cNvSpPr txBox="1"/>
+          <p:nvPr/>
+        </p:nvSpPr>
+        <p:spPr>
+          <a:xfrm>
+            <a:off x="1470335" y="2617204"/>
+            <a:ext cx="1260281" cy="369332"/>
+          </a:xfrm>
+          <a:prstGeom prst="rect">
+            <a:avLst/>
+          </a:prstGeom>
+          <a:noFill/>
+        </p:spPr>
+        <p:txBody>
+          <a:bodyPr wrap="none" rtlCol="0">
+            <a:spAutoFit/>
+          </a:bodyPr>
+          <a:lstStyle/>
+          <a:p>
+            <a:r>
+              <a:rPr lang="fr-FR" dirty="0" smtClean="0"/>
+              <a:t>Notepad++</a:t>
+            </a:r>
+            <a:endParaRPr lang="fr-FR" dirty="0"/>
+          </a:p>
+        </p:txBody>
+      </p:sp>
     </p:spTree>
     <p:extLst>
       <p:ext uri="{BB962C8B-B14F-4D97-AF65-F5344CB8AC3E}">
@@ -12136,7 +13799,7 @@
 </p:sld>
 </file>
 
-<file path=ppt/slides/slide7.xml><?xml version="1.0" encoding="utf-8"?>
+<file path=ppt/slides/slide8.xml><?xml version="1.0" encoding="utf-8"?>
 <p:sld xmlns:a="http://schemas.openxmlformats.org/drawingml/2006/main" xmlns:r="http://schemas.openxmlformats.org/officeDocument/2006/relationships" xmlns:p="http://schemas.openxmlformats.org/presentationml/2006/main">
   <p:cSld>
     <p:spTree>
@@ -12170,7 +13833,7 @@
           <a:p>
             <a:r>
               <a:rPr lang="fr-FR" dirty="0" smtClean="0"/>
-              <a:t>Conception :</a:t>
+              <a:t>Conception:</a:t>
             </a:r>
             <a:endParaRPr lang="fr-FR" dirty="0"/>
           </a:p>
@@ -12186,12 +13849,29 @@
             <p:ph idx="1"/>
           </p:nvPr>
         </p:nvSpPr>
-        <p:spPr/>
+        <p:spPr>
+          <a:xfrm>
+            <a:off x="1475656" y="2667000"/>
+            <a:ext cx="7211144" cy="3332816"/>
+          </a:xfrm>
+        </p:spPr>
         <p:txBody>
-          <a:bodyPr/>
+          <a:bodyPr anchor="t">
+            <a:normAutofit/>
+          </a:bodyPr>
           <a:lstStyle/>
           <a:p>
-            <a:endParaRPr lang="fr-FR"/>
+            <a:r>
+              <a:rPr lang="en-US" sz="2800" dirty="0" smtClean="0"/>
+              <a:t>Mockups</a:t>
+            </a:r>
+          </a:p>
+          <a:p>
+            <a:r>
+              <a:rPr lang="en-US" sz="2800" dirty="0" smtClean="0"/>
+              <a:t>MCD</a:t>
+            </a:r>
+            <a:endParaRPr lang="en-US" sz="2800" dirty="0"/>
           </a:p>
         </p:txBody>
       </p:sp>
@@ -12208,7 +13888,7 @@
 </p:sld>
 </file>
 
-<file path=ppt/slides/slide8.xml><?xml version="1.0" encoding="utf-8"?>
+<file path=ppt/slides/slide9.xml><?xml version="1.0" encoding="utf-8"?>
 <p:sld xmlns:a="http://schemas.openxmlformats.org/drawingml/2006/main" xmlns:r="http://schemas.openxmlformats.org/officeDocument/2006/relationships" xmlns:p="http://schemas.openxmlformats.org/presentationml/2006/main">
   <p:cSld>
     <p:spTree>
@@ -12235,35 +13915,84 @@
             <p:ph type="title"/>
           </p:nvPr>
         </p:nvSpPr>
-        <p:spPr/>
+        <p:spPr>
+          <a:xfrm>
+            <a:off x="982133" y="457201"/>
+            <a:ext cx="7704667" cy="1099591"/>
+          </a:xfrm>
+        </p:spPr>
         <p:txBody>
           <a:bodyPr/>
           <a:lstStyle/>
           <a:p>
             <a:r>
-              <a:rPr lang="fr-FR" dirty="0" smtClean="0"/>
-              <a:t>*MOCKUP*</a:t>
+              <a:rPr lang="fr-FR" dirty="0" err="1" smtClean="0"/>
+              <a:t>Mockups</a:t>
+            </a:r>
+            <a:r>
+              <a:rPr lang="fr-FR" dirty="0"/>
+              <a:t>:</a:t>
             </a:r>
             <a:endParaRPr lang="fr-FR" dirty="0"/>
           </a:p>
         </p:txBody>
       </p:sp>
-      <p:sp>
-        <p:nvSpPr>
-          <p:cNvPr id="7" name="Espace réservé du contenu 6"/>
-          <p:cNvSpPr>
-            <a:spLocks noGrp="1"/>
-          </p:cNvSpPr>
+      <p:pic>
+        <p:nvPicPr>
+          <p:cNvPr id="6" name="Espace réservé du contenu 5"/>
+          <p:cNvPicPr>
+            <a:picLocks noGrp="1" noChangeAspect="1"/>
+          </p:cNvPicPr>
           <p:nvPr>
             <p:ph idx="1"/>
           </p:nvPr>
+        </p:nvPicPr>
+        <p:blipFill rotWithShape="1">
+          <a:blip r:embed="rId2" cstate="print">
+            <a:extLst>
+              <a:ext uri="{28A0092B-C50C-407E-A947-70E740481C1C}">
+                <a14:useLocalDpi xmlns:a14="http://schemas.microsoft.com/office/drawing/2010/main" val="0"/>
+              </a:ext>
+            </a:extLst>
+          </a:blip>
+          <a:srcRect r="5614" b="-5367"/>
+          <a:stretch/>
+        </p:blipFill>
+        <p:spPr>
+          <a:xfrm>
+            <a:off x="1208501" y="2420888"/>
+            <a:ext cx="7478299" cy="3438440"/>
+          </a:xfrm>
+        </p:spPr>
+      </p:pic>
+      <p:sp>
+        <p:nvSpPr>
+          <p:cNvPr id="8" name="ZoneTexte 7"/>
+          <p:cNvSpPr txBox="1"/>
+          <p:nvPr/>
         </p:nvSpPr>
-        <p:spPr/>
+        <p:spPr>
+          <a:xfrm>
+            <a:off x="1115616" y="1700808"/>
+            <a:ext cx="7344816" cy="584775"/>
+          </a:xfrm>
+          <a:prstGeom prst="rect">
+            <a:avLst/>
+          </a:prstGeom>
+          <a:noFill/>
+        </p:spPr>
         <p:txBody>
-          <a:bodyPr/>
+          <a:bodyPr wrap="square" rtlCol="0">
+            <a:spAutoFit/>
+          </a:bodyPr>
           <a:lstStyle/>
           <a:p>
-            <a:endParaRPr lang="fr-FR"/>
+            <a:pPr algn="ctr"/>
+            <a:r>
+              <a:rPr lang="fr-FR" sz="3200" dirty="0" smtClean="0"/>
+              <a:t>Main page:</a:t>
+            </a:r>
+            <a:endParaRPr lang="fr-FR" sz="3200" dirty="0"/>
           </a:p>
         </p:txBody>
       </p:sp>
@@ -12284,78 +14013,6 @@
       </p:par>
     </p:tnLst>
   </p:timing>
-</p:sld>
-</file>
-
-<file path=ppt/slides/slide9.xml><?xml version="1.0" encoding="utf-8"?>
-<p:sld xmlns:a="http://schemas.openxmlformats.org/drawingml/2006/main" xmlns:r="http://schemas.openxmlformats.org/officeDocument/2006/relationships" xmlns:p="http://schemas.openxmlformats.org/presentationml/2006/main">
-  <p:cSld>
-    <p:spTree>
-      <p:nvGrpSpPr>
-        <p:cNvPr id="1" name=""/>
-        <p:cNvGrpSpPr/>
-        <p:nvPr/>
-      </p:nvGrpSpPr>
-      <p:grpSpPr>
-        <a:xfrm>
-          <a:off x="0" y="0"/>
-          <a:ext cx="0" cy="0"/>
-          <a:chOff x="0" y="0"/>
-          <a:chExt cx="0" cy="0"/>
-        </a:xfrm>
-      </p:grpSpPr>
-      <p:sp>
-        <p:nvSpPr>
-          <p:cNvPr id="2" name="Titre 1"/>
-          <p:cNvSpPr>
-            <a:spLocks noGrp="1"/>
-          </p:cNvSpPr>
-          <p:nvPr>
-            <p:ph type="title"/>
-          </p:nvPr>
-        </p:nvSpPr>
-        <p:spPr/>
-        <p:txBody>
-          <a:bodyPr/>
-          <a:lstStyle/>
-          <a:p>
-            <a:r>
-              <a:rPr lang="fr-FR" dirty="0" smtClean="0"/>
-              <a:t>*MCD*</a:t>
-            </a:r>
-            <a:endParaRPr lang="fr-FR" dirty="0"/>
-          </a:p>
-        </p:txBody>
-      </p:sp>
-      <p:sp>
-        <p:nvSpPr>
-          <p:cNvPr id="4" name="Espace réservé du contenu 3"/>
-          <p:cNvSpPr>
-            <a:spLocks noGrp="1"/>
-          </p:cNvSpPr>
-          <p:nvPr>
-            <p:ph idx="1"/>
-          </p:nvPr>
-        </p:nvSpPr>
-        <p:spPr/>
-        <p:txBody>
-          <a:bodyPr/>
-          <a:lstStyle/>
-          <a:p>
-            <a:endParaRPr lang="fr-FR"/>
-          </a:p>
-        </p:txBody>
-      </p:sp>
-    </p:spTree>
-    <p:extLst>
-      <p:ext uri="{BB962C8B-B14F-4D97-AF65-F5344CB8AC3E}">
-        <p14:creationId xmlns:p14="http://schemas.microsoft.com/office/powerpoint/2010/main" val="2542732291"/>
-      </p:ext>
-    </p:extLst>
-  </p:cSld>
-  <p:clrMapOvr>
-    <a:masterClrMapping/>
-  </p:clrMapOvr>
 </p:sld>
 </file>
 

</xml_diff>